<commit_message>
applied LOD to Tableau and finalized slides for DE
</commit_message>
<xml_diff>
--- a/Final Presentation - Slides v2.pptx
+++ b/Final Presentation - Slides v2.pptx
@@ -117,23 +117,46 @@
 </p:presentation>
 </file>
 
+<file path=ppt/revisionInfo.xml><?xml version="1.0" encoding="utf-8"?>
+<p1510:revInfo xmlns:a="http://schemas.openxmlformats.org/drawingml/2006/main" xmlns:r="http://schemas.openxmlformats.org/officeDocument/2006/relationships" xmlns:p1510="http://schemas.microsoft.com/office/powerpoint/2015/10/main">
+  <p1510:revLst>
+    <p1510:client id="{7061B644-E664-4C9D-A51D-E4E3A9CA133F}" v="1" dt="2021-05-25T21:44:07.550"/>
+  </p1510:revLst>
+</p1510:revInfo>
+</file>
+
 <file path=ppt/changesInfos/changesInfo1.xml><?xml version="1.0" encoding="utf-8"?>
 <pc:chgInfo xmlns:a="http://schemas.openxmlformats.org/drawingml/2006/main" xmlns:r="http://schemas.openxmlformats.org/officeDocument/2006/relationships" xmlns:ac="http://schemas.microsoft.com/office/drawing/2013/main/command" xmlns:pc="http://schemas.microsoft.com/office/powerpoint/2013/main/command">
   <pc:docChgLst>
     <pc:chgData name="Dustin Elery" userId="843a45bcdfe74c68" providerId="LiveId" clId="{7061B644-E664-4C9D-A51D-E4E3A9CA133F}"/>
     <pc:docChg chg="modSld">
-      <pc:chgData name="Dustin Elery" userId="843a45bcdfe74c68" providerId="LiveId" clId="{7061B644-E664-4C9D-A51D-E4E3A9CA133F}" dt="2021-05-25T18:57:17.843" v="3" actId="20577"/>
+      <pc:chgData name="Dustin Elery" userId="843a45bcdfe74c68" providerId="LiveId" clId="{7061B644-E664-4C9D-A51D-E4E3A9CA133F}" dt="2021-05-25T21:44:07.537" v="15" actId="20577"/>
       <pc:docMkLst>
         <pc:docMk/>
       </pc:docMkLst>
       <pc:sldChg chg="modSp mod">
-        <pc:chgData name="Dustin Elery" userId="843a45bcdfe74c68" providerId="LiveId" clId="{7061B644-E664-4C9D-A51D-E4E3A9CA133F}" dt="2021-05-25T18:57:17.843" v="3" actId="20577"/>
+        <pc:chgData name="Dustin Elery" userId="843a45bcdfe74c68" providerId="LiveId" clId="{7061B644-E664-4C9D-A51D-E4E3A9CA133F}" dt="2021-05-25T21:43:44.566" v="13" actId="20577"/>
+        <pc:sldMkLst>
+          <pc:docMk/>
+          <pc:sldMk cId="2114131046" sldId="257"/>
+        </pc:sldMkLst>
+        <pc:spChg chg="mod">
+          <ac:chgData name="Dustin Elery" userId="843a45bcdfe74c68" providerId="LiveId" clId="{7061B644-E664-4C9D-A51D-E4E3A9CA133F}" dt="2021-05-25T21:43:44.566" v="13" actId="20577"/>
+          <ac:spMkLst>
+            <pc:docMk/>
+            <pc:sldMk cId="2114131046" sldId="257"/>
+            <ac:spMk id="3" creationId="{3C0623D7-2467-4D8F-BAD4-FDE6952FC6D1}"/>
+          </ac:spMkLst>
+        </pc:spChg>
+      </pc:sldChg>
+      <pc:sldChg chg="modSp mod">
+        <pc:chgData name="Dustin Elery" userId="843a45bcdfe74c68" providerId="LiveId" clId="{7061B644-E664-4C9D-A51D-E4E3A9CA133F}" dt="2021-05-25T21:44:07.537" v="15" actId="20577"/>
         <pc:sldMkLst>
           <pc:docMk/>
           <pc:sldMk cId="3374226764" sldId="258"/>
         </pc:sldMkLst>
         <pc:spChg chg="mod">
-          <ac:chgData name="Dustin Elery" userId="843a45bcdfe74c68" providerId="LiveId" clId="{7061B644-E664-4C9D-A51D-E4E3A9CA133F}" dt="2021-05-25T18:57:17.843" v="3" actId="20577"/>
+          <ac:chgData name="Dustin Elery" userId="843a45bcdfe74c68" providerId="LiveId" clId="{7061B644-E664-4C9D-A51D-E4E3A9CA133F}" dt="2021-05-25T21:44:07.537" v="15" actId="20577"/>
           <ac:spMkLst>
             <pc:docMk/>
             <pc:sldMk cId="3374226764" sldId="258"/>
@@ -4039,7 +4062,7 @@
           <a:p>
             <a:r>
               <a:rPr lang="en-US" dirty="0"/>
-              <a:t>Tableau Functions Used: Hover filter, Cluster Model (Analytics)</a:t>
+              <a:t>Tableau Functions Used: Hover filter, Cluster Model (Analytics), LOD</a:t>
             </a:r>
           </a:p>
           <a:p>
@@ -4159,8 +4182,22 @@
           <a:p>
             <a:r>
               <a:rPr lang="en-US" dirty="0"/>
-              <a:t>Link to Dashboard’s</a:t>
-            </a:r>
+              <a:t>Link to Dashboards</a:t>
+            </a:r>
+            <a:r>
+              <a:rPr lang="en-US"/>
+              <a:t>: </a:t>
+            </a:r>
+            <a:r>
+              <a:rPr lang="en-US">
+                <a:hlinkClick r:id="rId2"/>
+              </a:rPr>
+              <a:t>https://public.tableau.com/profile/dustin.elery#!/vizhome/SharkTankDashboard/DealsDashboard?publish=yes</a:t>
+            </a:r>
+            <a:endParaRPr lang="en-US"/>
+          </a:p>
+          <a:p>
+            <a:endParaRPr lang="en-US" dirty="0"/>
           </a:p>
         </p:txBody>
       </p:sp>

</xml_diff>

<commit_message>
final slide clean up
</commit_message>
<xml_diff>
--- a/Final Presentation - Slides v2.pptx
+++ b/Final Presentation - Slides v2.pptx
@@ -121,7 +121,7 @@
 <file path=ppt/revisionInfo.xml><?xml version="1.0" encoding="utf-8"?>
 <p1510:revInfo xmlns:a="http://schemas.openxmlformats.org/drawingml/2006/main" xmlns:r="http://schemas.openxmlformats.org/officeDocument/2006/relationships" xmlns:p1510="http://schemas.microsoft.com/office/powerpoint/2015/10/main">
   <p1510:revLst>
-    <p1510:client id="{7061B644-E664-4C9D-A51D-E4E3A9CA133F}" v="6" dt="2021-05-25T22:46:48.932"/>
+    <p1510:client id="{7061B644-E664-4C9D-A51D-E4E3A9CA133F}" v="11" dt="2021-05-27T21:47:04.819"/>
   </p1510:revLst>
 </p1510:revInfo>
 </file>
@@ -130,19 +130,19 @@
 <pc:chgInfo xmlns:a="http://schemas.openxmlformats.org/drawingml/2006/main" xmlns:r="http://schemas.openxmlformats.org/officeDocument/2006/relationships" xmlns:ac="http://schemas.microsoft.com/office/drawing/2013/main/command" xmlns:pc="http://schemas.microsoft.com/office/powerpoint/2013/main/command">
   <pc:docChgLst>
     <pc:chgData name="Dustin Elery" userId="843a45bcdfe74c68" providerId="LiveId" clId="{7061B644-E664-4C9D-A51D-E4E3A9CA133F}"/>
-    <pc:docChg chg="addSld modSld">
-      <pc:chgData name="Dustin Elery" userId="843a45bcdfe74c68" providerId="LiveId" clId="{7061B644-E664-4C9D-A51D-E4E3A9CA133F}" dt="2021-05-25T22:46:48.931" v="36" actId="1076"/>
+    <pc:docChg chg="custSel addSld modSld">
+      <pc:chgData name="Dustin Elery" userId="843a45bcdfe74c68" providerId="LiveId" clId="{7061B644-E664-4C9D-A51D-E4E3A9CA133F}" dt="2021-05-27T21:47:08.390" v="50" actId="6549"/>
       <pc:docMkLst>
         <pc:docMk/>
       </pc:docMkLst>
       <pc:sldChg chg="modSp mod">
-        <pc:chgData name="Dustin Elery" userId="843a45bcdfe74c68" providerId="LiveId" clId="{7061B644-E664-4C9D-A51D-E4E3A9CA133F}" dt="2021-05-25T21:43:44.566" v="13" actId="20577"/>
+        <pc:chgData name="Dustin Elery" userId="843a45bcdfe74c68" providerId="LiveId" clId="{7061B644-E664-4C9D-A51D-E4E3A9CA133F}" dt="2021-05-27T21:45:52.376" v="48" actId="20577"/>
         <pc:sldMkLst>
           <pc:docMk/>
           <pc:sldMk cId="2114131046" sldId="257"/>
         </pc:sldMkLst>
         <pc:spChg chg="mod">
-          <ac:chgData name="Dustin Elery" userId="843a45bcdfe74c68" providerId="LiveId" clId="{7061B644-E664-4C9D-A51D-E4E3A9CA133F}" dt="2021-05-25T21:43:44.566" v="13" actId="20577"/>
+          <ac:chgData name="Dustin Elery" userId="843a45bcdfe74c68" providerId="LiveId" clId="{7061B644-E664-4C9D-A51D-E4E3A9CA133F}" dt="2021-05-27T21:45:52.376" v="48" actId="20577"/>
           <ac:spMkLst>
             <pc:docMk/>
             <pc:sldMk cId="2114131046" sldId="257"/>
@@ -162,6 +162,36 @@
             <pc:docMk/>
             <pc:sldMk cId="3374226764" sldId="258"/>
             <ac:spMk id="3" creationId="{29CEC16E-434D-443C-A166-CD9FFBDAF6F4}"/>
+          </ac:spMkLst>
+        </pc:spChg>
+      </pc:sldChg>
+      <pc:sldChg chg="modSp mod">
+        <pc:chgData name="Dustin Elery" userId="843a45bcdfe74c68" providerId="LiveId" clId="{7061B644-E664-4C9D-A51D-E4E3A9CA133F}" dt="2021-05-27T21:44:01.737" v="43" actId="20577"/>
+        <pc:sldMkLst>
+          <pc:docMk/>
+          <pc:sldMk cId="2797378828" sldId="259"/>
+        </pc:sldMkLst>
+        <pc:spChg chg="mod">
+          <ac:chgData name="Dustin Elery" userId="843a45bcdfe74c68" providerId="LiveId" clId="{7061B644-E664-4C9D-A51D-E4E3A9CA133F}" dt="2021-05-27T21:44:01.737" v="43" actId="20577"/>
+          <ac:spMkLst>
+            <pc:docMk/>
+            <pc:sldMk cId="2797378828" sldId="259"/>
+            <ac:spMk id="3" creationId="{56378123-B45F-4820-8C37-C3ADE0149D6C}"/>
+          </ac:spMkLst>
+        </pc:spChg>
+      </pc:sldChg>
+      <pc:sldChg chg="modSp mod">
+        <pc:chgData name="Dustin Elery" userId="843a45bcdfe74c68" providerId="LiveId" clId="{7061B644-E664-4C9D-A51D-E4E3A9CA133F}" dt="2021-05-27T21:47:08.390" v="50" actId="6549"/>
+        <pc:sldMkLst>
+          <pc:docMk/>
+          <pc:sldMk cId="481207256" sldId="261"/>
+        </pc:sldMkLst>
+        <pc:spChg chg="mod">
+          <ac:chgData name="Dustin Elery" userId="843a45bcdfe74c68" providerId="LiveId" clId="{7061B644-E664-4C9D-A51D-E4E3A9CA133F}" dt="2021-05-27T21:47:08.390" v="50" actId="6549"/>
+          <ac:spMkLst>
+            <pc:docMk/>
+            <pc:sldMk cId="481207256" sldId="261"/>
+            <ac:spMk id="3" creationId="{9D18BAC3-756A-4160-AB1D-DE81D19076C3}"/>
           </ac:spMkLst>
         </pc:spChg>
       </pc:sldChg>
@@ -364,7 +394,7 @@
           <a:p>
             <a:fld id="{4F3678CF-D104-4239-89B1-FD35BB7C6CFA}" type="datetimeFigureOut">
               <a:rPr lang="en-US" smtClean="0"/>
-              <a:t>5/25/2021</a:t>
+              <a:t>5/27/2021</a:t>
             </a:fld>
             <a:endParaRPr lang="en-US" dirty="0"/>
           </a:p>
@@ -534,7 +564,7 @@
           <a:p>
             <a:fld id="{4F3678CF-D104-4239-89B1-FD35BB7C6CFA}" type="datetimeFigureOut">
               <a:rPr lang="en-US" smtClean="0"/>
-              <a:t>5/25/2021</a:t>
+              <a:t>5/27/2021</a:t>
             </a:fld>
             <a:endParaRPr lang="en-US" dirty="0"/>
           </a:p>
@@ -714,7 +744,7 @@
           <a:p>
             <a:fld id="{4F3678CF-D104-4239-89B1-FD35BB7C6CFA}" type="datetimeFigureOut">
               <a:rPr lang="en-US" smtClean="0"/>
-              <a:t>5/25/2021</a:t>
+              <a:t>5/27/2021</a:t>
             </a:fld>
             <a:endParaRPr lang="en-US" dirty="0"/>
           </a:p>
@@ -884,7 +914,7 @@
           <a:p>
             <a:fld id="{4F3678CF-D104-4239-89B1-FD35BB7C6CFA}" type="datetimeFigureOut">
               <a:rPr lang="en-US" smtClean="0"/>
-              <a:t>5/25/2021</a:t>
+              <a:t>5/27/2021</a:t>
             </a:fld>
             <a:endParaRPr lang="en-US" dirty="0"/>
           </a:p>
@@ -1152,7 +1182,7 @@
           <a:p>
             <a:fld id="{4F3678CF-D104-4239-89B1-FD35BB7C6CFA}" type="datetimeFigureOut">
               <a:rPr lang="en-US" smtClean="0"/>
-              <a:t>5/25/2021</a:t>
+              <a:t>5/27/2021</a:t>
             </a:fld>
             <a:endParaRPr lang="en-US" dirty="0"/>
           </a:p>
@@ -1384,7 +1414,7 @@
           <a:p>
             <a:fld id="{4F3678CF-D104-4239-89B1-FD35BB7C6CFA}" type="datetimeFigureOut">
               <a:rPr lang="en-US" smtClean="0"/>
-              <a:t>5/25/2021</a:t>
+              <a:t>5/27/2021</a:t>
             </a:fld>
             <a:endParaRPr lang="en-US" dirty="0"/>
           </a:p>
@@ -1743,7 +1773,7 @@
           <a:p>
             <a:fld id="{4F3678CF-D104-4239-89B1-FD35BB7C6CFA}" type="datetimeFigureOut">
               <a:rPr lang="en-US" smtClean="0"/>
-              <a:t>5/25/2021</a:t>
+              <a:t>5/27/2021</a:t>
             </a:fld>
             <a:endParaRPr lang="en-US" dirty="0"/>
           </a:p>
@@ -1884,7 +1914,7 @@
           <a:p>
             <a:fld id="{4F3678CF-D104-4239-89B1-FD35BB7C6CFA}" type="datetimeFigureOut">
               <a:rPr lang="en-US" smtClean="0"/>
-              <a:t>5/25/2021</a:t>
+              <a:t>5/27/2021</a:t>
             </a:fld>
             <a:endParaRPr lang="en-US" dirty="0"/>
           </a:p>
@@ -1979,7 +2009,7 @@
           <a:p>
             <a:fld id="{4F3678CF-D104-4239-89B1-FD35BB7C6CFA}" type="datetimeFigureOut">
               <a:rPr lang="en-US" smtClean="0"/>
-              <a:t>5/25/2021</a:t>
+              <a:t>5/27/2021</a:t>
             </a:fld>
             <a:endParaRPr lang="en-US" dirty="0"/>
           </a:p>
@@ -2336,7 +2366,7 @@
           <a:p>
             <a:fld id="{4F3678CF-D104-4239-89B1-FD35BB7C6CFA}" type="datetimeFigureOut">
               <a:rPr lang="en-US" smtClean="0"/>
-              <a:t>5/25/2021</a:t>
+              <a:t>5/27/2021</a:t>
             </a:fld>
             <a:endParaRPr lang="en-US" dirty="0"/>
           </a:p>
@@ -2692,7 +2722,7 @@
           <a:p>
             <a:fld id="{4F3678CF-D104-4239-89B1-FD35BB7C6CFA}" type="datetimeFigureOut">
               <a:rPr lang="en-US" smtClean="0"/>
-              <a:t>5/25/2021</a:t>
+              <a:t>5/27/2021</a:t>
             </a:fld>
             <a:endParaRPr lang="en-US" dirty="0"/>
           </a:p>
@@ -2934,7 +2964,7 @@
           <a:p>
             <a:fld id="{4F3678CF-D104-4239-89B1-FD35BB7C6CFA}" type="datetimeFigureOut">
               <a:rPr lang="en-US" smtClean="0"/>
-              <a:t>5/25/2021</a:t>
+              <a:t>5/27/2021</a:t>
             </a:fld>
             <a:endParaRPr lang="en-US" dirty="0"/>
           </a:p>
@@ -3616,13 +3646,7 @@
           <a:p>
             <a:r>
               <a:rPr lang="en-US" dirty="0"/>
-              <a:t>Data Source:</a:t>
-            </a:r>
-          </a:p>
-          <a:p>
-            <a:r>
-              <a:rPr lang="en-US" dirty="0"/>
-              <a:t>ETL</a:t>
+              <a:t>Data Source and ETL</a:t>
             </a:r>
           </a:p>
           <a:p>
@@ -3898,13 +3922,8 @@
           <a:p>
             <a:r>
               <a:rPr lang="en-US" dirty="0"/>
-              <a:t>Library: </a:t>
-            </a:r>
-            <a:r>
-              <a:rPr lang="en-US" dirty="0" err="1"/>
-              <a:t>SKLearn</a:t>
-            </a:r>
-            <a:endParaRPr lang="en-US" dirty="0"/>
+              <a:t>Library: SKLearn</a:t>
+            </a:r>
           </a:p>
           <a:p>
             <a:pPr lvl="1"/>
@@ -3914,39 +3933,7 @@
             </a:r>
             <a:r>
               <a:rPr lang="en-US" dirty="0"/>
-              <a:t>, </a:t>
-            </a:r>
-            <a:r>
-              <a:rPr lang="en-US" dirty="0" err="1"/>
-              <a:t>DecisionTree</a:t>
-            </a:r>
-            <a:r>
-              <a:rPr lang="en-US" dirty="0"/>
-              <a:t>, </a:t>
-            </a:r>
-            <a:r>
-              <a:rPr lang="en-US" dirty="0" err="1"/>
-              <a:t>RandomForest</a:t>
-            </a:r>
-            <a:r>
-              <a:rPr lang="en-US" dirty="0"/>
-              <a:t>, </a:t>
-            </a:r>
-            <a:r>
-              <a:rPr lang="en-US" dirty="0" err="1"/>
-              <a:t>GradientBoosting</a:t>
-            </a:r>
-            <a:r>
-              <a:rPr lang="en-US" dirty="0"/>
-              <a:t>, SGD,  SVM, </a:t>
-            </a:r>
-            <a:r>
-              <a:rPr lang="en-US" dirty="0" err="1"/>
-              <a:t>MultiNomialNB</a:t>
-            </a:r>
-            <a:r>
-              <a:rPr lang="en-US" dirty="0"/>
-              <a:t>, Metrics</a:t>
+              <a:t>, DecisionTree, RandomForest, GradientBoosting, SGD,  SVM, MultiNomialNB, Metrics</a:t>
             </a:r>
           </a:p>
           <a:p>
@@ -4094,7 +4081,7 @@
           <a:p>
             <a:r>
               <a:rPr lang="en-US" dirty="0"/>
-              <a:t>Tableau Functions Used: Hover filter, Cluster Model (Analytics), LOD</a:t>
+              <a:t>Tableau Functions Used: Click filter, Cluster Model (Analytics), LOD</a:t>
             </a:r>
           </a:p>
           <a:p>
@@ -4214,19 +4201,15 @@
           <a:p>
             <a:r>
               <a:rPr lang="en-US" dirty="0"/>
-              <a:t>Link to Dashboards</a:t>
-            </a:r>
-            <a:r>
-              <a:rPr lang="en-US"/>
-              <a:t>: </a:t>
-            </a:r>
-            <a:r>
-              <a:rPr lang="en-US">
+              <a:t>Link to Dashboards: </a:t>
+            </a:r>
+            <a:r>
+              <a:rPr lang="en-US" dirty="0">
                 <a:hlinkClick r:id="rId2"/>
               </a:rPr>
               <a:t>https://public.tableau.com/profile/dustin.elery#!/vizhome/SharkTankDashboard/DealsDashboard?publish=yes</a:t>
             </a:r>
-            <a:endParaRPr lang="en-US"/>
+            <a:endParaRPr lang="en-US" dirty="0"/>
           </a:p>
           <a:p>
             <a:endParaRPr lang="en-US" dirty="0"/>

</xml_diff>